<commit_message>
Capítulo 10: Java I/O - Organização de tópicos.
</commit_message>
<xml_diff>
--- a/2-Java-Programmer-Modulo-II/16.Capitulo10.pptx
+++ b/2-Java-Programmer-Modulo-II/16.Capitulo10.pptx
@@ -5,21 +5,22 @@
     <p:sldMasterId id="2147483660" r:id="rId1"/>
   </p:sldMasterIdLst>
   <p:notesMasterIdLst>
-    <p:notesMasterId r:id="rId14"/>
+    <p:notesMasterId r:id="rId15"/>
   </p:notesMasterIdLst>
   <p:sldIdLst>
     <p:sldId id="256" r:id="rId2"/>
-    <p:sldId id="298" r:id="rId3"/>
-    <p:sldId id="299" r:id="rId4"/>
-    <p:sldId id="300" r:id="rId5"/>
-    <p:sldId id="301" r:id="rId6"/>
-    <p:sldId id="302" r:id="rId7"/>
-    <p:sldId id="303" r:id="rId8"/>
-    <p:sldId id="304" r:id="rId9"/>
-    <p:sldId id="305" r:id="rId10"/>
-    <p:sldId id="306" r:id="rId11"/>
-    <p:sldId id="307" r:id="rId12"/>
-    <p:sldId id="308" r:id="rId13"/>
+    <p:sldId id="309" r:id="rId3"/>
+    <p:sldId id="298" r:id="rId4"/>
+    <p:sldId id="299" r:id="rId5"/>
+    <p:sldId id="300" r:id="rId6"/>
+    <p:sldId id="301" r:id="rId7"/>
+    <p:sldId id="302" r:id="rId8"/>
+    <p:sldId id="303" r:id="rId9"/>
+    <p:sldId id="304" r:id="rId10"/>
+    <p:sldId id="305" r:id="rId11"/>
+    <p:sldId id="306" r:id="rId12"/>
+    <p:sldId id="307" r:id="rId13"/>
+    <p:sldId id="308" r:id="rId14"/>
   </p:sldIdLst>
   <p:sldSz cx="9144000" cy="6858000" type="screen4x3"/>
   <p:notesSz cx="6858000" cy="9144000"/>
@@ -260,7 +261,7 @@
               <a:pPr>
                 <a:defRPr/>
               </a:pPr>
-              <a:t>30/04/2012</a:t>
+              <a:t>02/05/2012</a:t>
             </a:fld>
             <a:endParaRPr lang="pt-BR"/>
           </a:p>
@@ -729,7 +730,7 @@
       </p:grpSpPr>
       <p:sp>
         <p:nvSpPr>
-          <p:cNvPr id="29698" name="Espaço Reservado para Imagem de Slide 1"/>
+          <p:cNvPr id="28674" name="Espaço Reservado para Imagem de Slide 1"/>
           <p:cNvSpPr>
             <a:spLocks noGrp="1" noRot="1" noChangeAspect="1" noTextEdit="1"/>
           </p:cNvSpPr>
@@ -751,7 +752,7 @@
       </p:sp>
       <p:sp>
         <p:nvSpPr>
-          <p:cNvPr id="29699" name="Espaço Reservado para Anotações 2"/>
+          <p:cNvPr id="28675" name="Espaço Reservado para Anotações 2"/>
           <p:cNvSpPr>
             <a:spLocks noGrp="1"/>
           </p:cNvSpPr>
@@ -792,7 +793,7 @@
             <a:pPr>
               <a:defRPr/>
             </a:pPr>
-            <a:fld id="{0F139F0C-3366-48F3-A388-8D5CB0E390FF}" type="slidenum">
+            <a:fld id="{CB3FF845-4009-4067-8E08-C6A18F56A150}" type="slidenum">
               <a:rPr lang="pt-BR" smtClean="0"/>
               <a:pPr>
                 <a:defRPr/>
@@ -830,7 +831,7 @@
       </p:grpSpPr>
       <p:sp>
         <p:nvSpPr>
-          <p:cNvPr id="30722" name="Espaço Reservado para Imagem de Slide 1"/>
+          <p:cNvPr id="29698" name="Espaço Reservado para Imagem de Slide 1"/>
           <p:cNvSpPr>
             <a:spLocks noGrp="1" noRot="1" noChangeAspect="1" noTextEdit="1"/>
           </p:cNvSpPr>
@@ -852,7 +853,7 @@
       </p:sp>
       <p:sp>
         <p:nvSpPr>
-          <p:cNvPr id="30723" name="Espaço Reservado para Anotações 2"/>
+          <p:cNvPr id="29699" name="Espaço Reservado para Anotações 2"/>
           <p:cNvSpPr>
             <a:spLocks noGrp="1"/>
           </p:cNvSpPr>
@@ -893,7 +894,7 @@
             <a:pPr>
               <a:defRPr/>
             </a:pPr>
-            <a:fld id="{2B496507-147A-4E90-8297-737FD993F4E5}" type="slidenum">
+            <a:fld id="{0F139F0C-3366-48F3-A388-8D5CB0E390FF}" type="slidenum">
               <a:rPr lang="pt-BR" smtClean="0"/>
               <a:pPr>
                 <a:defRPr/>
@@ -931,7 +932,7 @@
       </p:grpSpPr>
       <p:sp>
         <p:nvSpPr>
-          <p:cNvPr id="31746" name="Espaço Reservado para Imagem de Slide 1"/>
+          <p:cNvPr id="30722" name="Espaço Reservado para Imagem de Slide 1"/>
           <p:cNvSpPr>
             <a:spLocks noGrp="1" noRot="1" noChangeAspect="1" noTextEdit="1"/>
           </p:cNvSpPr>
@@ -953,7 +954,7 @@
       </p:sp>
       <p:sp>
         <p:nvSpPr>
-          <p:cNvPr id="31747" name="Espaço Reservado para Anotações 2"/>
+          <p:cNvPr id="30723" name="Espaço Reservado para Anotações 2"/>
           <p:cNvSpPr>
             <a:spLocks noGrp="1"/>
           </p:cNvSpPr>
@@ -994,12 +995,113 @@
             <a:pPr>
               <a:defRPr/>
             </a:pPr>
-            <a:fld id="{95153150-84FA-41F4-9BF1-3F7875CF2B31}" type="slidenum">
+            <a:fld id="{2B496507-147A-4E90-8297-737FD993F4E5}" type="slidenum">
               <a:rPr lang="pt-BR" smtClean="0"/>
               <a:pPr>
                 <a:defRPr/>
               </a:pPr>
               <a:t>12</a:t>
+            </a:fld>
+            <a:endParaRPr lang="pt-BR"/>
+          </a:p>
+        </p:txBody>
+      </p:sp>
+    </p:spTree>
+  </p:cSld>
+  <p:clrMapOvr>
+    <a:masterClrMapping/>
+  </p:clrMapOvr>
+</p:notes>
+</file>
+
+<file path=ppt/notesSlides/notesSlide13.xml><?xml version="1.0" encoding="utf-8"?>
+<p:notes xmlns:a="http://schemas.openxmlformats.org/drawingml/2006/main" xmlns:r="http://schemas.openxmlformats.org/officeDocument/2006/relationships" xmlns:p="http://schemas.openxmlformats.org/presentationml/2006/main">
+  <p:cSld>
+    <p:spTree>
+      <p:nvGrpSpPr>
+        <p:cNvPr id="1" name=""/>
+        <p:cNvGrpSpPr/>
+        <p:nvPr/>
+      </p:nvGrpSpPr>
+      <p:grpSpPr>
+        <a:xfrm>
+          <a:off x="0" y="0"/>
+          <a:ext cx="0" cy="0"/>
+          <a:chOff x="0" y="0"/>
+          <a:chExt cx="0" cy="0"/>
+        </a:xfrm>
+      </p:grpSpPr>
+      <p:sp>
+        <p:nvSpPr>
+          <p:cNvPr id="31746" name="Espaço Reservado para Imagem de Slide 1"/>
+          <p:cNvSpPr>
+            <a:spLocks noGrp="1" noRot="1" noChangeAspect="1" noTextEdit="1"/>
+          </p:cNvSpPr>
+          <p:nvPr>
+            <p:ph type="sldImg"/>
+          </p:nvPr>
+        </p:nvSpPr>
+        <p:spPr bwMode="auto">
+          <a:noFill/>
+          <a:ln>
+            <a:solidFill>
+              <a:srgbClr val="000000"/>
+            </a:solidFill>
+            <a:miter lim="800000"/>
+            <a:headEnd/>
+            <a:tailEnd/>
+          </a:ln>
+        </p:spPr>
+      </p:sp>
+      <p:sp>
+        <p:nvSpPr>
+          <p:cNvPr id="31747" name="Espaço Reservado para Anotações 2"/>
+          <p:cNvSpPr>
+            <a:spLocks noGrp="1"/>
+          </p:cNvSpPr>
+          <p:nvPr>
+            <p:ph type="body" idx="1"/>
+          </p:nvPr>
+        </p:nvSpPr>
+        <p:spPr bwMode="auto">
+          <a:noFill/>
+        </p:spPr>
+        <p:txBody>
+          <a:bodyPr wrap="square" numCol="1" anchor="t" anchorCtr="0" compatLnSpc="1">
+            <a:prstTxWarp prst="textNoShape">
+              <a:avLst/>
+            </a:prstTxWarp>
+          </a:bodyPr>
+          <a:lstStyle/>
+          <a:p>
+            <a:endParaRPr lang="pt-BR" smtClean="0"/>
+          </a:p>
+        </p:txBody>
+      </p:sp>
+      <p:sp>
+        <p:nvSpPr>
+          <p:cNvPr id="4" name="Espaço Reservado para Número de Slide 3"/>
+          <p:cNvSpPr>
+            <a:spLocks noGrp="1"/>
+          </p:cNvSpPr>
+          <p:nvPr>
+            <p:ph type="sldNum" sz="quarter" idx="5"/>
+          </p:nvPr>
+        </p:nvSpPr>
+        <p:spPr/>
+        <p:txBody>
+          <a:bodyPr/>
+          <a:lstStyle/>
+          <a:p>
+            <a:pPr>
+              <a:defRPr/>
+            </a:pPr>
+            <a:fld id="{95153150-84FA-41F4-9BF1-3F7875CF2B31}" type="slidenum">
+              <a:rPr lang="pt-BR" smtClean="0"/>
+              <a:pPr>
+                <a:defRPr/>
+              </a:pPr>
+              <a:t>13</a:t>
             </a:fld>
             <a:endParaRPr lang="pt-BR"/>
           </a:p>
@@ -1032,29 +1134,19 @@
       </p:grpSpPr>
       <p:sp>
         <p:nvSpPr>
-          <p:cNvPr id="21506" name="Espaço Reservado para Imagem de Slide 1"/>
-          <p:cNvSpPr>
-            <a:spLocks noGrp="1" noRot="1" noChangeAspect="1" noTextEdit="1"/>
+          <p:cNvPr id="2" name="Espaço Reservado para Imagem de Slide 1"/>
+          <p:cNvSpPr>
+            <a:spLocks noGrp="1" noRot="1" noChangeAspect="1"/>
           </p:cNvSpPr>
           <p:nvPr>
             <p:ph type="sldImg"/>
           </p:nvPr>
         </p:nvSpPr>
-        <p:spPr bwMode="auto">
-          <a:noFill/>
-          <a:ln>
-            <a:solidFill>
-              <a:srgbClr val="000000"/>
-            </a:solidFill>
-            <a:miter lim="800000"/>
-            <a:headEnd/>
-            <a:tailEnd/>
-          </a:ln>
-        </p:spPr>
-      </p:sp>
-      <p:sp>
-        <p:nvSpPr>
-          <p:cNvPr id="21507" name="Espaço Reservado para Anotações 2"/>
+        <p:spPr/>
+      </p:sp>
+      <p:sp>
+        <p:nvSpPr>
+          <p:cNvPr id="3" name="Espaço Reservado para Anotações 2"/>
           <p:cNvSpPr>
             <a:spLocks noGrp="1"/>
           </p:cNvSpPr>
@@ -1062,18 +1154,14 @@
             <p:ph type="body" idx="1"/>
           </p:nvPr>
         </p:nvSpPr>
-        <p:spPr bwMode="auto">
-          <a:noFill/>
-        </p:spPr>
-        <p:txBody>
-          <a:bodyPr wrap="square" numCol="1" anchor="t" anchorCtr="0" compatLnSpc="1">
-            <a:prstTxWarp prst="textNoShape">
-              <a:avLst/>
-            </a:prstTxWarp>
+        <p:spPr/>
+        <p:txBody>
+          <a:bodyPr>
+            <a:normAutofit/>
           </a:bodyPr>
           <a:lstStyle/>
           <a:p>
-            <a:endParaRPr lang="pt-BR" smtClean="0"/>
+            <a:endParaRPr lang="pt-BR"/>
           </a:p>
         </p:txBody>
       </p:sp>
@@ -1084,7 +1172,7 @@
             <a:spLocks noGrp="1"/>
           </p:cNvSpPr>
           <p:nvPr>
-            <p:ph type="sldNum" sz="quarter" idx="5"/>
+            <p:ph type="sldNum" sz="quarter" idx="10"/>
           </p:nvPr>
         </p:nvSpPr>
         <p:spPr/>
@@ -1095,7 +1183,7 @@
             <a:pPr>
               <a:defRPr/>
             </a:pPr>
-            <a:fld id="{A2739769-D500-4250-868A-C2B8871F91CD}" type="slidenum">
+            <a:fld id="{373010A1-97EB-4147-B509-23B1A33D8481}" type="slidenum">
               <a:rPr lang="pt-BR" smtClean="0"/>
               <a:pPr>
                 <a:defRPr/>
@@ -1133,7 +1221,7 @@
       </p:grpSpPr>
       <p:sp>
         <p:nvSpPr>
-          <p:cNvPr id="22530" name="Espaço Reservado para Imagem de Slide 1"/>
+          <p:cNvPr id="21506" name="Espaço Reservado para Imagem de Slide 1"/>
           <p:cNvSpPr>
             <a:spLocks noGrp="1" noRot="1" noChangeAspect="1" noTextEdit="1"/>
           </p:cNvSpPr>
@@ -1155,7 +1243,7 @@
       </p:sp>
       <p:sp>
         <p:nvSpPr>
-          <p:cNvPr id="22531" name="Espaço Reservado para Anotações 2"/>
+          <p:cNvPr id="21507" name="Espaço Reservado para Anotações 2"/>
           <p:cNvSpPr>
             <a:spLocks noGrp="1"/>
           </p:cNvSpPr>
@@ -1196,7 +1284,7 @@
             <a:pPr>
               <a:defRPr/>
             </a:pPr>
-            <a:fld id="{64A97453-8B32-4B96-9F3E-71E78682158D}" type="slidenum">
+            <a:fld id="{A2739769-D500-4250-868A-C2B8871F91CD}" type="slidenum">
               <a:rPr lang="pt-BR" smtClean="0"/>
               <a:pPr>
                 <a:defRPr/>
@@ -1234,7 +1322,7 @@
       </p:grpSpPr>
       <p:sp>
         <p:nvSpPr>
-          <p:cNvPr id="23554" name="Espaço Reservado para Imagem de Slide 1"/>
+          <p:cNvPr id="22530" name="Espaço Reservado para Imagem de Slide 1"/>
           <p:cNvSpPr>
             <a:spLocks noGrp="1" noRot="1" noChangeAspect="1" noTextEdit="1"/>
           </p:cNvSpPr>
@@ -1256,7 +1344,7 @@
       </p:sp>
       <p:sp>
         <p:nvSpPr>
-          <p:cNvPr id="23555" name="Espaço Reservado para Anotações 2"/>
+          <p:cNvPr id="22531" name="Espaço Reservado para Anotações 2"/>
           <p:cNvSpPr>
             <a:spLocks noGrp="1"/>
           </p:cNvSpPr>
@@ -1297,7 +1385,7 @@
             <a:pPr>
               <a:defRPr/>
             </a:pPr>
-            <a:fld id="{6B8F65D9-89BC-4556-92A1-CAFAFB5983F5}" type="slidenum">
+            <a:fld id="{64A97453-8B32-4B96-9F3E-71E78682158D}" type="slidenum">
               <a:rPr lang="pt-BR" smtClean="0"/>
               <a:pPr>
                 <a:defRPr/>
@@ -1335,7 +1423,7 @@
       </p:grpSpPr>
       <p:sp>
         <p:nvSpPr>
-          <p:cNvPr id="24578" name="Espaço Reservado para Imagem de Slide 1"/>
+          <p:cNvPr id="23554" name="Espaço Reservado para Imagem de Slide 1"/>
           <p:cNvSpPr>
             <a:spLocks noGrp="1" noRot="1" noChangeAspect="1" noTextEdit="1"/>
           </p:cNvSpPr>
@@ -1357,7 +1445,7 @@
       </p:sp>
       <p:sp>
         <p:nvSpPr>
-          <p:cNvPr id="24579" name="Espaço Reservado para Anotações 2"/>
+          <p:cNvPr id="23555" name="Espaço Reservado para Anotações 2"/>
           <p:cNvSpPr>
             <a:spLocks noGrp="1"/>
           </p:cNvSpPr>
@@ -1398,7 +1486,7 @@
             <a:pPr>
               <a:defRPr/>
             </a:pPr>
-            <a:fld id="{34175632-67D5-4670-88B2-2454E24DEDD1}" type="slidenum">
+            <a:fld id="{6B8F65D9-89BC-4556-92A1-CAFAFB5983F5}" type="slidenum">
               <a:rPr lang="pt-BR" smtClean="0"/>
               <a:pPr>
                 <a:defRPr/>
@@ -1436,7 +1524,7 @@
       </p:grpSpPr>
       <p:sp>
         <p:nvSpPr>
-          <p:cNvPr id="25602" name="Espaço Reservado para Imagem de Slide 1"/>
+          <p:cNvPr id="24578" name="Espaço Reservado para Imagem de Slide 1"/>
           <p:cNvSpPr>
             <a:spLocks noGrp="1" noRot="1" noChangeAspect="1" noTextEdit="1"/>
           </p:cNvSpPr>
@@ -1458,7 +1546,7 @@
       </p:sp>
       <p:sp>
         <p:nvSpPr>
-          <p:cNvPr id="25603" name="Espaço Reservado para Anotações 2"/>
+          <p:cNvPr id="24579" name="Espaço Reservado para Anotações 2"/>
           <p:cNvSpPr>
             <a:spLocks noGrp="1"/>
           </p:cNvSpPr>
@@ -1499,7 +1587,7 @@
             <a:pPr>
               <a:defRPr/>
             </a:pPr>
-            <a:fld id="{D8C329BD-2EA1-406B-9012-15A398588625}" type="slidenum">
+            <a:fld id="{34175632-67D5-4670-88B2-2454E24DEDD1}" type="slidenum">
               <a:rPr lang="pt-BR" smtClean="0"/>
               <a:pPr>
                 <a:defRPr/>
@@ -1537,7 +1625,7 @@
       </p:grpSpPr>
       <p:sp>
         <p:nvSpPr>
-          <p:cNvPr id="26626" name="Espaço Reservado para Imagem de Slide 1"/>
+          <p:cNvPr id="25602" name="Espaço Reservado para Imagem de Slide 1"/>
           <p:cNvSpPr>
             <a:spLocks noGrp="1" noRot="1" noChangeAspect="1" noTextEdit="1"/>
           </p:cNvSpPr>
@@ -1559,7 +1647,7 @@
       </p:sp>
       <p:sp>
         <p:nvSpPr>
-          <p:cNvPr id="26627" name="Espaço Reservado para Anotações 2"/>
+          <p:cNvPr id="25603" name="Espaço Reservado para Anotações 2"/>
           <p:cNvSpPr>
             <a:spLocks noGrp="1"/>
           </p:cNvSpPr>
@@ -1600,7 +1688,7 @@
             <a:pPr>
               <a:defRPr/>
             </a:pPr>
-            <a:fld id="{06A37879-4216-4327-8CFB-D8AEF1EC61E8}" type="slidenum">
+            <a:fld id="{D8C329BD-2EA1-406B-9012-15A398588625}" type="slidenum">
               <a:rPr lang="pt-BR" smtClean="0"/>
               <a:pPr>
                 <a:defRPr/>
@@ -1638,7 +1726,7 @@
       </p:grpSpPr>
       <p:sp>
         <p:nvSpPr>
-          <p:cNvPr id="27650" name="Espaço Reservado para Imagem de Slide 1"/>
+          <p:cNvPr id="26626" name="Espaço Reservado para Imagem de Slide 1"/>
           <p:cNvSpPr>
             <a:spLocks noGrp="1" noRot="1" noChangeAspect="1" noTextEdit="1"/>
           </p:cNvSpPr>
@@ -1660,7 +1748,7 @@
       </p:sp>
       <p:sp>
         <p:nvSpPr>
-          <p:cNvPr id="27651" name="Espaço Reservado para Anotações 2"/>
+          <p:cNvPr id="26627" name="Espaço Reservado para Anotações 2"/>
           <p:cNvSpPr>
             <a:spLocks noGrp="1"/>
           </p:cNvSpPr>
@@ -1701,7 +1789,7 @@
             <a:pPr>
               <a:defRPr/>
             </a:pPr>
-            <a:fld id="{97D91471-377B-409D-85B3-CCD3C72F2590}" type="slidenum">
+            <a:fld id="{06A37879-4216-4327-8CFB-D8AEF1EC61E8}" type="slidenum">
               <a:rPr lang="pt-BR" smtClean="0"/>
               <a:pPr>
                 <a:defRPr/>
@@ -1739,7 +1827,7 @@
       </p:grpSpPr>
       <p:sp>
         <p:nvSpPr>
-          <p:cNvPr id="28674" name="Espaço Reservado para Imagem de Slide 1"/>
+          <p:cNvPr id="27650" name="Espaço Reservado para Imagem de Slide 1"/>
           <p:cNvSpPr>
             <a:spLocks noGrp="1" noRot="1" noChangeAspect="1" noTextEdit="1"/>
           </p:cNvSpPr>
@@ -1761,7 +1849,7 @@
       </p:sp>
       <p:sp>
         <p:nvSpPr>
-          <p:cNvPr id="28675" name="Espaço Reservado para Anotações 2"/>
+          <p:cNvPr id="27651" name="Espaço Reservado para Anotações 2"/>
           <p:cNvSpPr>
             <a:spLocks noGrp="1"/>
           </p:cNvSpPr>
@@ -1802,7 +1890,7 @@
             <a:pPr>
               <a:defRPr/>
             </a:pPr>
-            <a:fld id="{CB3FF845-4009-4067-8E08-C6A18F56A150}" type="slidenum">
+            <a:fld id="{97D91471-377B-409D-85B3-CCD3C72F2590}" type="slidenum">
               <a:rPr lang="pt-BR" smtClean="0"/>
               <a:pPr>
                 <a:defRPr/>
@@ -2236,7 +2324,10 @@
             </a:pPr>
             <a:fld id="{45D5A6A2-C68B-40CA-9E37-D72BA046AE71}" type="datetime1">
               <a:rPr lang="pt-BR" smtClean="0"/>
-              <a:t>30/04/2012</a:t>
+              <a:pPr>
+                <a:defRPr/>
+              </a:pPr>
+              <a:t>02/05/2012</a:t>
             </a:fld>
             <a:endParaRPr lang="pt-BR"/>
           </a:p>
@@ -2425,7 +2516,10 @@
             </a:pPr>
             <a:fld id="{255B29BB-7A37-4304-A0D4-BC9D95EBBF73}" type="datetime1">
               <a:rPr lang="pt-BR" smtClean="0"/>
-              <a:t>30/04/2012</a:t>
+              <a:pPr>
+                <a:defRPr/>
+              </a:pPr>
+              <a:t>02/05/2012</a:t>
             </a:fld>
             <a:endParaRPr lang="pt-BR"/>
           </a:p>
@@ -2624,7 +2718,10 @@
             </a:pPr>
             <a:fld id="{4F319AA9-B850-4052-9F05-059628A352AA}" type="datetime1">
               <a:rPr lang="pt-BR" smtClean="0"/>
-              <a:t>30/04/2012</a:t>
+              <a:pPr>
+                <a:defRPr/>
+              </a:pPr>
+              <a:t>02/05/2012</a:t>
             </a:fld>
             <a:endParaRPr lang="pt-BR"/>
           </a:p>
@@ -2817,7 +2914,10 @@
             </a:pPr>
             <a:fld id="{4907CC71-A433-4586-96D2-DA4193EACA1F}" type="datetime1">
               <a:rPr lang="pt-BR" smtClean="0"/>
-              <a:t>30/04/2012</a:t>
+              <a:pPr>
+                <a:defRPr/>
+              </a:pPr>
+              <a:t>02/05/2012</a:t>
             </a:fld>
             <a:endParaRPr lang="pt-BR"/>
           </a:p>
@@ -3320,7 +3420,10 @@
             </a:pPr>
             <a:fld id="{DF99C00B-5FE9-43E4-A8D9-33CBBA8BD092}" type="datetime1">
               <a:rPr lang="pt-BR" smtClean="0"/>
-              <a:t>30/04/2012</a:t>
+              <a:pPr>
+                <a:defRPr/>
+              </a:pPr>
+              <a:t>02/05/2012</a:t>
             </a:fld>
             <a:endParaRPr lang="pt-BR"/>
           </a:p>
@@ -3608,7 +3711,10 @@
             </a:pPr>
             <a:fld id="{F350991C-853B-4EF3-A97B-E787F7281166}" type="datetime1">
               <a:rPr lang="pt-BR" smtClean="0"/>
-              <a:t>30/04/2012</a:t>
+              <a:pPr>
+                <a:defRPr/>
+              </a:pPr>
+              <a:t>02/05/2012</a:t>
             </a:fld>
             <a:endParaRPr lang="pt-BR"/>
           </a:p>
@@ -4006,7 +4112,10 @@
             </a:pPr>
             <a:fld id="{BC0F18D3-0149-41C9-AD6A-BF51FF911158}" type="datetime1">
               <a:rPr lang="pt-BR" smtClean="0"/>
-              <a:t>30/04/2012</a:t>
+              <a:pPr>
+                <a:defRPr/>
+              </a:pPr>
+              <a:t>02/05/2012</a:t>
             </a:fld>
             <a:endParaRPr lang="pt-BR"/>
           </a:p>
@@ -4152,7 +4261,10 @@
             </a:pPr>
             <a:fld id="{04BCA835-AAE5-49A3-9629-E7C2848CAC9F}" type="datetime1">
               <a:rPr lang="pt-BR" smtClean="0"/>
-              <a:t>30/04/2012</a:t>
+              <a:pPr>
+                <a:defRPr/>
+              </a:pPr>
+              <a:t>02/05/2012</a:t>
             </a:fld>
             <a:endParaRPr lang="pt-BR"/>
           </a:p>
@@ -4266,7 +4378,10 @@
             </a:pPr>
             <a:fld id="{BE9B7CE1-2BBC-4F3A-8132-700BCE528D53}" type="datetime1">
               <a:rPr lang="pt-BR" smtClean="0"/>
-              <a:t>30/04/2012</a:t>
+              <a:pPr>
+                <a:defRPr/>
+              </a:pPr>
+              <a:t>02/05/2012</a:t>
             </a:fld>
             <a:endParaRPr lang="pt-BR"/>
           </a:p>
@@ -4539,7 +4654,10 @@
             </a:pPr>
             <a:fld id="{6762FDF2-B98B-411A-8532-AE207D83727B}" type="datetime1">
               <a:rPr lang="pt-BR" smtClean="0"/>
-              <a:t>30/04/2012</a:t>
+              <a:pPr>
+                <a:defRPr/>
+              </a:pPr>
+              <a:t>02/05/2012</a:t>
             </a:fld>
             <a:endParaRPr lang="pt-BR"/>
           </a:p>
@@ -4820,7 +4938,10 @@
             </a:pPr>
             <a:fld id="{E2516530-859C-4788-AB8F-91D51CC31A55}" type="datetime1">
               <a:rPr lang="pt-BR" smtClean="0"/>
-              <a:t>30/04/2012</a:t>
+              <a:pPr>
+                <a:defRPr/>
+              </a:pPr>
+              <a:t>02/05/2012</a:t>
             </a:fld>
             <a:endParaRPr lang="pt-BR"/>
           </a:p>
@@ -5295,7 +5416,10 @@
             </a:pPr>
             <a:fld id="{D789166A-69C1-43C9-BE1B-964C9E953AB2}" type="datetime1">
               <a:rPr lang="pt-BR" smtClean="0"/>
-              <a:t>30/04/2012</a:t>
+              <a:pPr>
+                <a:defRPr/>
+              </a:pPr>
+              <a:t>02/05/2012</a:t>
             </a:fld>
             <a:endParaRPr lang="pt-BR"/>
           </a:p>
@@ -5947,7 +6071,7 @@
       </p:grpSpPr>
       <p:sp>
         <p:nvSpPr>
-          <p:cNvPr id="16386" name="Título 1"/>
+          <p:cNvPr id="15362" name="Título 1"/>
           <p:cNvSpPr>
             <a:spLocks noGrp="1"/>
           </p:cNvSpPr>
@@ -5963,14 +6087,14 @@
             <a:pPr eaLnBrk="1" hangingPunct="1"/>
             <a:r>
               <a:rPr lang="pt-BR" smtClean="0"/>
-              <a:t>Classe BufferedReader</a:t>
-            </a:r>
-          </a:p>
-        </p:txBody>
-      </p:sp>
-      <p:sp>
-        <p:nvSpPr>
-          <p:cNvPr id="16387" name="Espaço Reservado para Conteúdo 2"/>
+              <a:t>Classe FileReader</a:t>
+            </a:r>
+          </a:p>
+        </p:txBody>
+      </p:sp>
+      <p:sp>
+        <p:nvSpPr>
+          <p:cNvPr id="15363" name="Espaço Reservado para Conteúdo 2"/>
           <p:cNvSpPr>
             <a:spLocks noGrp="1"/>
           </p:cNvSpPr>
@@ -6043,7 +6167,7 @@
       </p:grpSpPr>
       <p:sp>
         <p:nvSpPr>
-          <p:cNvPr id="17410" name="Título 1"/>
+          <p:cNvPr id="16386" name="Título 1"/>
           <p:cNvSpPr>
             <a:spLocks noGrp="1"/>
           </p:cNvSpPr>
@@ -6059,14 +6183,14 @@
             <a:pPr eaLnBrk="1" hangingPunct="1"/>
             <a:r>
               <a:rPr lang="pt-BR" smtClean="0"/>
-              <a:t>RandomAccessFile</a:t>
-            </a:r>
-          </a:p>
-        </p:txBody>
-      </p:sp>
-      <p:sp>
-        <p:nvSpPr>
-          <p:cNvPr id="17411" name="Espaço Reservado para Conteúdo 2"/>
+              <a:t>Classe BufferedReader</a:t>
+            </a:r>
+          </a:p>
+        </p:txBody>
+      </p:sp>
+      <p:sp>
+        <p:nvSpPr>
+          <p:cNvPr id="16387" name="Espaço Reservado para Conteúdo 2"/>
           <p:cNvSpPr>
             <a:spLocks noGrp="1"/>
           </p:cNvSpPr>
@@ -6139,7 +6263,7 @@
       </p:grpSpPr>
       <p:sp>
         <p:nvSpPr>
-          <p:cNvPr id="18434" name="Título 1"/>
+          <p:cNvPr id="17410" name="Título 1"/>
           <p:cNvSpPr>
             <a:spLocks noGrp="1"/>
           </p:cNvSpPr>
@@ -6155,14 +6279,14 @@
             <a:pPr eaLnBrk="1" hangingPunct="1"/>
             <a:r>
               <a:rPr lang="pt-BR" smtClean="0"/>
-              <a:t>Path</a:t>
-            </a:r>
-          </a:p>
-        </p:txBody>
-      </p:sp>
-      <p:sp>
-        <p:nvSpPr>
-          <p:cNvPr id="18435" name="Espaço Reservado para Conteúdo 2"/>
+              <a:t>RandomAccessFile</a:t>
+            </a:r>
+          </a:p>
+        </p:txBody>
+      </p:sp>
+      <p:sp>
+        <p:nvSpPr>
+          <p:cNvPr id="17411" name="Espaço Reservado para Conteúdo 2"/>
           <p:cNvSpPr>
             <a:spLocks noGrp="1"/>
           </p:cNvSpPr>
@@ -6203,6 +6327,102 @@
                 <a:defRPr/>
               </a:pPr>
               <a:t>12</a:t>
+            </a:fld>
+            <a:endParaRPr lang="pt-BR"/>
+          </a:p>
+        </p:txBody>
+      </p:sp>
+    </p:spTree>
+  </p:cSld>
+  <p:clrMapOvr>
+    <a:masterClrMapping/>
+  </p:clrMapOvr>
+</p:sld>
+</file>
+
+<file path=ppt/slides/slide13.xml><?xml version="1.0" encoding="utf-8"?>
+<p:sld xmlns:a="http://schemas.openxmlformats.org/drawingml/2006/main" xmlns:r="http://schemas.openxmlformats.org/officeDocument/2006/relationships" xmlns:p="http://schemas.openxmlformats.org/presentationml/2006/main">
+  <p:cSld>
+    <p:spTree>
+      <p:nvGrpSpPr>
+        <p:cNvPr id="1" name=""/>
+        <p:cNvGrpSpPr/>
+        <p:nvPr/>
+      </p:nvGrpSpPr>
+      <p:grpSpPr>
+        <a:xfrm>
+          <a:off x="0" y="0"/>
+          <a:ext cx="0" cy="0"/>
+          <a:chOff x="0" y="0"/>
+          <a:chExt cx="0" cy="0"/>
+        </a:xfrm>
+      </p:grpSpPr>
+      <p:sp>
+        <p:nvSpPr>
+          <p:cNvPr id="18434" name="Título 1"/>
+          <p:cNvSpPr>
+            <a:spLocks noGrp="1"/>
+          </p:cNvSpPr>
+          <p:nvPr>
+            <p:ph type="title"/>
+          </p:nvPr>
+        </p:nvSpPr>
+        <p:spPr/>
+        <p:txBody>
+          <a:bodyPr/>
+          <a:lstStyle/>
+          <a:p>
+            <a:pPr eaLnBrk="1" hangingPunct="1"/>
+            <a:r>
+              <a:rPr lang="pt-BR" smtClean="0"/>
+              <a:t>Path</a:t>
+            </a:r>
+          </a:p>
+        </p:txBody>
+      </p:sp>
+      <p:sp>
+        <p:nvSpPr>
+          <p:cNvPr id="18435" name="Espaço Reservado para Conteúdo 2"/>
+          <p:cNvSpPr>
+            <a:spLocks noGrp="1"/>
+          </p:cNvSpPr>
+          <p:nvPr>
+            <p:ph idx="1"/>
+          </p:nvPr>
+        </p:nvSpPr>
+        <p:spPr/>
+        <p:txBody>
+          <a:bodyPr/>
+          <a:lstStyle/>
+          <a:p>
+            <a:endParaRPr lang="pt-BR" smtClean="0"/>
+          </a:p>
+        </p:txBody>
+      </p:sp>
+      <p:sp>
+        <p:nvSpPr>
+          <p:cNvPr id="4" name="Espaço Reservado para Número de Slide 3"/>
+          <p:cNvSpPr>
+            <a:spLocks noGrp="1"/>
+          </p:cNvSpPr>
+          <p:nvPr>
+            <p:ph type="sldNum" sz="quarter" idx="12"/>
+          </p:nvPr>
+        </p:nvSpPr>
+        <p:spPr/>
+        <p:txBody>
+          <a:bodyPr/>
+          <a:lstStyle/>
+          <a:p>
+            <a:pPr>
+              <a:defRPr/>
+            </a:pPr>
+            <a:fld id="{676AE120-6210-44C4-9C14-8704E13AF0BD}" type="slidenum">
+              <a:rPr lang="pt-BR" smtClean="0"/>
+              <a:pPr>
+                <a:defRPr/>
+              </a:pPr>
+              <a:t>13</a:t>
             </a:fld>
             <a:endParaRPr lang="pt-BR"/>
           </a:p>
@@ -6235,7 +6455,7 @@
       </p:grpSpPr>
       <p:sp>
         <p:nvSpPr>
-          <p:cNvPr id="8194" name="Título 1"/>
+          <p:cNvPr id="2" name="Título 1"/>
           <p:cNvSpPr>
             <a:spLocks noGrp="1"/>
           </p:cNvSpPr>
@@ -6248,22 +6468,26 @@
           <a:bodyPr/>
           <a:lstStyle/>
           <a:p>
-            <a:pPr eaLnBrk="1" hangingPunct="1"/>
-            <a:r>
-              <a:rPr lang="pt-BR" smtClean="0"/>
-              <a:t>Classe OutputStream</a:t>
-            </a:r>
-          </a:p>
-        </p:txBody>
-      </p:sp>
-      <p:sp>
-        <p:nvSpPr>
-          <p:cNvPr id="8195" name="Espaço Reservado para Conteúdo 2"/>
-          <p:cNvSpPr>
-            <a:spLocks noGrp="1"/>
-          </p:cNvSpPr>
-          <p:nvPr>
-            <p:ph idx="1"/>
+            <a:r>
+              <a:rPr lang="pt-BR" dirty="0" err="1" smtClean="0"/>
+              <a:t>Stream</a:t>
+            </a:r>
+            <a:r>
+              <a:rPr lang="pt-BR" dirty="0" smtClean="0"/>
+              <a:t> – Fluxo I/O </a:t>
+            </a:r>
+            <a:endParaRPr lang="pt-BR" dirty="0"/>
+          </a:p>
+        </p:txBody>
+      </p:sp>
+      <p:sp>
+        <p:nvSpPr>
+          <p:cNvPr id="3" name="Espaço Reservado para Conteúdo 2"/>
+          <p:cNvSpPr>
+            <a:spLocks noGrp="1"/>
+          </p:cNvSpPr>
+          <p:nvPr>
+            <p:ph sz="half" idx="1"/>
           </p:nvPr>
         </p:nvSpPr>
         <p:spPr/>
@@ -6271,13 +6495,333 @@
           <a:bodyPr/>
           <a:lstStyle/>
           <a:p>
-            <a:endParaRPr lang="pt-BR" smtClean="0"/>
-          </a:p>
-        </p:txBody>
-      </p:sp>
-      <p:sp>
-        <p:nvSpPr>
-          <p:cNvPr id="4" name="Espaço Reservado para Número de Slide 3"/>
+            <a:r>
+              <a:rPr lang="pt-BR" sz="2400" dirty="0" smtClean="0"/>
+              <a:t>Acessando o sistema de arquivos</a:t>
+            </a:r>
+          </a:p>
+          <a:p>
+            <a:pPr lvl="1"/>
+            <a:r>
+              <a:rPr lang="pt-BR" sz="2000" dirty="0" err="1" smtClean="0"/>
+              <a:t>java</a:t>
+            </a:r>
+            <a:r>
+              <a:rPr lang="pt-BR" sz="2000" dirty="0" smtClean="0"/>
+              <a:t>.</a:t>
+            </a:r>
+            <a:r>
+              <a:rPr lang="pt-BR" sz="2000" dirty="0" err="1" smtClean="0"/>
+              <a:t>io</a:t>
+            </a:r>
+            <a:r>
+              <a:rPr lang="pt-BR" sz="2000" dirty="0" smtClean="0"/>
+              <a:t>.File</a:t>
+            </a:r>
+            <a:endParaRPr lang="pt-BR" sz="2000" dirty="0" smtClean="0"/>
+          </a:p>
+          <a:p>
+            <a:r>
+              <a:rPr lang="pt-BR" sz="2400" dirty="0" smtClean="0"/>
+              <a:t>Gravação em arquivos texto</a:t>
+            </a:r>
+          </a:p>
+          <a:p>
+            <a:pPr lvl="1"/>
+            <a:r>
+              <a:rPr lang="pt-BR" sz="2000" dirty="0" err="1" smtClean="0"/>
+              <a:t>java</a:t>
+            </a:r>
+            <a:r>
+              <a:rPr lang="pt-BR" sz="2000" dirty="0" smtClean="0"/>
+              <a:t>.</a:t>
+            </a:r>
+            <a:r>
+              <a:rPr lang="pt-BR" sz="2000" dirty="0" err="1" smtClean="0"/>
+              <a:t>io</a:t>
+            </a:r>
+            <a:r>
+              <a:rPr lang="pt-BR" sz="2000" dirty="0" smtClean="0"/>
+              <a:t>.</a:t>
+            </a:r>
+            <a:r>
+              <a:rPr lang="pt-BR" sz="2000" dirty="0" err="1" smtClean="0"/>
+              <a:t>FileWriter</a:t>
+            </a:r>
+            <a:endParaRPr lang="pt-BR" sz="2000" dirty="0" smtClean="0"/>
+          </a:p>
+          <a:p>
+            <a:pPr lvl="1"/>
+            <a:r>
+              <a:rPr lang="pt-BR" sz="2000" dirty="0" err="1" smtClean="0"/>
+              <a:t>java</a:t>
+            </a:r>
+            <a:r>
+              <a:rPr lang="pt-BR" sz="2000" dirty="0" smtClean="0"/>
+              <a:t>.</a:t>
+            </a:r>
+            <a:r>
+              <a:rPr lang="pt-BR" sz="2000" dirty="0" err="1" smtClean="0"/>
+              <a:t>io</a:t>
+            </a:r>
+            <a:r>
+              <a:rPr lang="pt-BR" sz="2000" dirty="0" smtClean="0"/>
+              <a:t>.</a:t>
+            </a:r>
+            <a:r>
+              <a:rPr lang="pt-BR" sz="2000" dirty="0" err="1" smtClean="0"/>
+              <a:t>BufferedWriter</a:t>
+            </a:r>
+            <a:endParaRPr lang="pt-BR" sz="2000" dirty="0" smtClean="0"/>
+          </a:p>
+          <a:p>
+            <a:pPr lvl="1"/>
+            <a:r>
+              <a:rPr lang="pt-BR" sz="2000" dirty="0" err="1" smtClean="0"/>
+              <a:t>java</a:t>
+            </a:r>
+            <a:r>
+              <a:rPr lang="pt-BR" sz="2000" dirty="0" smtClean="0"/>
+              <a:t>.</a:t>
+            </a:r>
+            <a:r>
+              <a:rPr lang="pt-BR" sz="2000" dirty="0" err="1" smtClean="0"/>
+              <a:t>io</a:t>
+            </a:r>
+            <a:r>
+              <a:rPr lang="pt-BR" sz="2000" dirty="0" smtClean="0"/>
+              <a:t>.</a:t>
+            </a:r>
+            <a:r>
+              <a:rPr lang="pt-BR" sz="2000" dirty="0" err="1" smtClean="0"/>
+              <a:t>PrintWriter</a:t>
+            </a:r>
+            <a:endParaRPr lang="pt-BR" sz="2000" dirty="0" smtClean="0"/>
+          </a:p>
+          <a:p>
+            <a:r>
+              <a:rPr lang="pt-BR" sz="2400" dirty="0" smtClean="0"/>
+              <a:t>Leitura em arquivos texto</a:t>
+            </a:r>
+          </a:p>
+          <a:p>
+            <a:pPr lvl="1"/>
+            <a:r>
+              <a:rPr lang="pt-BR" sz="2000" dirty="0" err="1" smtClean="0"/>
+              <a:t>java</a:t>
+            </a:r>
+            <a:r>
+              <a:rPr lang="pt-BR" sz="2000" dirty="0" smtClean="0"/>
+              <a:t>.</a:t>
+            </a:r>
+            <a:r>
+              <a:rPr lang="pt-BR" sz="2000" dirty="0" err="1" smtClean="0"/>
+              <a:t>io</a:t>
+            </a:r>
+            <a:r>
+              <a:rPr lang="pt-BR" sz="2000" dirty="0" smtClean="0"/>
+              <a:t>.</a:t>
+            </a:r>
+            <a:r>
+              <a:rPr lang="pt-BR" sz="2000" dirty="0" err="1" smtClean="0"/>
+              <a:t>FileReader</a:t>
+            </a:r>
+            <a:endParaRPr lang="pt-BR" sz="2000" dirty="0" smtClean="0"/>
+          </a:p>
+          <a:p>
+            <a:pPr lvl="1"/>
+            <a:r>
+              <a:rPr lang="pt-BR" sz="2000" dirty="0" err="1" smtClean="0"/>
+              <a:t>java</a:t>
+            </a:r>
+            <a:r>
+              <a:rPr lang="pt-BR" sz="2000" dirty="0" smtClean="0"/>
+              <a:t>.</a:t>
+            </a:r>
+            <a:r>
+              <a:rPr lang="pt-BR" sz="2000" dirty="0" err="1" smtClean="0"/>
+              <a:t>io</a:t>
+            </a:r>
+            <a:r>
+              <a:rPr lang="pt-BR" sz="2000" dirty="0" smtClean="0"/>
+              <a:t>.</a:t>
+            </a:r>
+            <a:r>
+              <a:rPr lang="pt-BR" sz="2000" dirty="0" err="1" smtClean="0"/>
+              <a:t>BufferedReader</a:t>
+            </a:r>
+            <a:endParaRPr lang="pt-BR" sz="2000" dirty="0" smtClean="0"/>
+          </a:p>
+          <a:p>
+            <a:endParaRPr lang="pt-BR" sz="2400" dirty="0"/>
+          </a:p>
+        </p:txBody>
+      </p:sp>
+      <p:sp>
+        <p:nvSpPr>
+          <p:cNvPr id="4" name="Espaço Reservado para Conteúdo 3"/>
+          <p:cNvSpPr>
+            <a:spLocks noGrp="1"/>
+          </p:cNvSpPr>
+          <p:nvPr>
+            <p:ph sz="half" idx="2"/>
+          </p:nvPr>
+        </p:nvSpPr>
+        <p:spPr>
+          <a:xfrm>
+            <a:off x="4267200" y="1600200"/>
+            <a:ext cx="4553272" cy="4525963"/>
+          </a:xfrm>
+        </p:spPr>
+        <p:txBody>
+          <a:bodyPr/>
+          <a:lstStyle/>
+          <a:p>
+            <a:r>
+              <a:rPr lang="pt-BR" sz="2400" dirty="0" smtClean="0"/>
+              <a:t>Gravação em arquivos binários</a:t>
+            </a:r>
+          </a:p>
+          <a:p>
+            <a:pPr lvl="1"/>
+            <a:r>
+              <a:rPr lang="pt-BR" sz="2000" dirty="0" err="1" smtClean="0"/>
+              <a:t>java</a:t>
+            </a:r>
+            <a:r>
+              <a:rPr lang="pt-BR" sz="2000" dirty="0" smtClean="0"/>
+              <a:t>.</a:t>
+            </a:r>
+            <a:r>
+              <a:rPr lang="pt-BR" sz="2000" dirty="0" err="1" smtClean="0"/>
+              <a:t>io</a:t>
+            </a:r>
+            <a:r>
+              <a:rPr lang="pt-BR" sz="2000" dirty="0" smtClean="0"/>
+              <a:t>.</a:t>
+            </a:r>
+            <a:r>
+              <a:rPr lang="pt-BR" sz="2000" dirty="0" err="1" smtClean="0"/>
+              <a:t>FileOutputStream</a:t>
+            </a:r>
+            <a:endParaRPr lang="pt-BR" sz="2000" dirty="0" smtClean="0"/>
+          </a:p>
+          <a:p>
+            <a:pPr lvl="1"/>
+            <a:r>
+              <a:rPr lang="pt-BR" sz="2000" dirty="0" err="1" smtClean="0"/>
+              <a:t>java</a:t>
+            </a:r>
+            <a:r>
+              <a:rPr lang="pt-BR" sz="2000" dirty="0" smtClean="0"/>
+              <a:t>.</a:t>
+            </a:r>
+            <a:r>
+              <a:rPr lang="pt-BR" sz="2000" dirty="0" err="1" smtClean="0"/>
+              <a:t>io</a:t>
+            </a:r>
+            <a:r>
+              <a:rPr lang="pt-BR" sz="2000" dirty="0" smtClean="0"/>
+              <a:t>.</a:t>
+            </a:r>
+            <a:r>
+              <a:rPr lang="pt-BR" sz="2000" dirty="0" err="1" smtClean="0"/>
+              <a:t>ByteArrayOutputStream</a:t>
+            </a:r>
+            <a:endParaRPr lang="pt-BR" sz="2000" dirty="0" smtClean="0"/>
+          </a:p>
+          <a:p>
+            <a:r>
+              <a:rPr lang="pt-BR" sz="2400" dirty="0" smtClean="0"/>
+              <a:t>Leitura em arquivos binários</a:t>
+            </a:r>
+          </a:p>
+          <a:p>
+            <a:pPr lvl="1"/>
+            <a:r>
+              <a:rPr lang="pt-BR" sz="2000" dirty="0" err="1" smtClean="0"/>
+              <a:t>java</a:t>
+            </a:r>
+            <a:r>
+              <a:rPr lang="pt-BR" sz="2000" dirty="0" smtClean="0"/>
+              <a:t>.</a:t>
+            </a:r>
+            <a:r>
+              <a:rPr lang="pt-BR" sz="2000" dirty="0" err="1" smtClean="0"/>
+              <a:t>io</a:t>
+            </a:r>
+            <a:r>
+              <a:rPr lang="pt-BR" sz="2000" dirty="0" smtClean="0"/>
+              <a:t>.</a:t>
+            </a:r>
+            <a:r>
+              <a:rPr lang="pt-BR" sz="2000" dirty="0" err="1" smtClean="0"/>
+              <a:t>FileInputStream</a:t>
+            </a:r>
+            <a:endParaRPr lang="pt-BR" sz="2000" dirty="0" smtClean="0"/>
+          </a:p>
+          <a:p>
+            <a:pPr lvl="1"/>
+            <a:r>
+              <a:rPr lang="pt-BR" sz="2000" dirty="0" err="1" smtClean="0"/>
+              <a:t>java</a:t>
+            </a:r>
+            <a:r>
+              <a:rPr lang="pt-BR" sz="2000" dirty="0" smtClean="0"/>
+              <a:t>.</a:t>
+            </a:r>
+            <a:r>
+              <a:rPr lang="pt-BR" sz="2000" dirty="0" err="1" smtClean="0"/>
+              <a:t>io</a:t>
+            </a:r>
+            <a:r>
+              <a:rPr lang="pt-BR" sz="2000" dirty="0" smtClean="0"/>
+              <a:t>.</a:t>
+            </a:r>
+            <a:r>
+              <a:rPr lang="pt-BR" sz="2000" dirty="0" err="1" smtClean="0"/>
+              <a:t>ByteArrayInputStream</a:t>
+            </a:r>
+            <a:endParaRPr lang="pt-BR" sz="2000" dirty="0" smtClean="0"/>
+          </a:p>
+          <a:p>
+            <a:r>
+              <a:rPr lang="pt-BR" sz="2400" dirty="0" smtClean="0"/>
+              <a:t>Arquivos de acesso randômico</a:t>
+            </a:r>
+          </a:p>
+          <a:p>
+            <a:pPr lvl="1"/>
+            <a:r>
+              <a:rPr lang="pt-BR" sz="2000" dirty="0" err="1" smtClean="0"/>
+              <a:t>java</a:t>
+            </a:r>
+            <a:r>
+              <a:rPr lang="pt-BR" sz="2000" dirty="0" smtClean="0"/>
+              <a:t>.</a:t>
+            </a:r>
+            <a:r>
+              <a:rPr lang="pt-BR" sz="2000" dirty="0" err="1" smtClean="0"/>
+              <a:t>io</a:t>
+            </a:r>
+            <a:r>
+              <a:rPr lang="pt-BR" sz="2000" dirty="0" smtClean="0"/>
+              <a:t>.</a:t>
+            </a:r>
+            <a:r>
+              <a:rPr lang="pt-BR" sz="2000" dirty="0" err="1" smtClean="0"/>
+              <a:t>RandomAccessFile</a:t>
+            </a:r>
+            <a:endParaRPr lang="pt-BR" sz="2000" dirty="0" smtClean="0"/>
+          </a:p>
+          <a:p>
+            <a:endParaRPr lang="pt-BR" sz="2400" dirty="0"/>
+          </a:p>
+        </p:txBody>
+      </p:sp>
+      <p:sp>
+        <p:nvSpPr>
+          <p:cNvPr id="5" name="Espaço Reservado para Número de Slide 4"/>
           <p:cNvSpPr>
             <a:spLocks noGrp="1"/>
           </p:cNvSpPr>
@@ -6293,7 +6837,7 @@
             <a:pPr>
               <a:defRPr/>
             </a:pPr>
-            <a:fld id="{676AE120-6210-44C4-9C14-8704E13AF0BD}" type="slidenum">
+            <a:fld id="{35C62884-6945-4AD0-B9E7-509287E8F1F5}" type="slidenum">
               <a:rPr lang="pt-BR" smtClean="0"/>
               <a:pPr>
                 <a:defRPr/>
@@ -6331,7 +6875,7 @@
       </p:grpSpPr>
       <p:sp>
         <p:nvSpPr>
-          <p:cNvPr id="9218" name="Título 1"/>
+          <p:cNvPr id="8194" name="Título 1"/>
           <p:cNvSpPr>
             <a:spLocks noGrp="1"/>
           </p:cNvSpPr>
@@ -6347,14 +6891,14 @@
             <a:pPr eaLnBrk="1" hangingPunct="1"/>
             <a:r>
               <a:rPr lang="pt-BR" smtClean="0"/>
-              <a:t>Métodos</a:t>
-            </a:r>
-          </a:p>
-        </p:txBody>
-      </p:sp>
-      <p:sp>
-        <p:nvSpPr>
-          <p:cNvPr id="9219" name="Espaço Reservado para Conteúdo 2"/>
+              <a:t>Classe OutputStream</a:t>
+            </a:r>
+          </a:p>
+        </p:txBody>
+      </p:sp>
+      <p:sp>
+        <p:nvSpPr>
+          <p:cNvPr id="8195" name="Espaço Reservado para Conteúdo 2"/>
           <p:cNvSpPr>
             <a:spLocks noGrp="1"/>
           </p:cNvSpPr>
@@ -6427,7 +6971,7 @@
       </p:grpSpPr>
       <p:sp>
         <p:nvSpPr>
-          <p:cNvPr id="10242" name="Título 1"/>
+          <p:cNvPr id="9218" name="Título 1"/>
           <p:cNvSpPr>
             <a:spLocks noGrp="1"/>
           </p:cNvSpPr>
@@ -6443,14 +6987,14 @@
             <a:pPr eaLnBrk="1" hangingPunct="1"/>
             <a:r>
               <a:rPr lang="pt-BR" smtClean="0"/>
-              <a:t>Classe InputStream</a:t>
-            </a:r>
-          </a:p>
-        </p:txBody>
-      </p:sp>
-      <p:sp>
-        <p:nvSpPr>
-          <p:cNvPr id="10243" name="Espaço Reservado para Conteúdo 2"/>
+              <a:t>Métodos</a:t>
+            </a:r>
+          </a:p>
+        </p:txBody>
+      </p:sp>
+      <p:sp>
+        <p:nvSpPr>
+          <p:cNvPr id="9219" name="Espaço Reservado para Conteúdo 2"/>
           <p:cNvSpPr>
             <a:spLocks noGrp="1"/>
           </p:cNvSpPr>
@@ -6523,7 +7067,7 @@
       </p:grpSpPr>
       <p:sp>
         <p:nvSpPr>
-          <p:cNvPr id="11266" name="Título 1"/>
+          <p:cNvPr id="10242" name="Título 1"/>
           <p:cNvSpPr>
             <a:spLocks noGrp="1"/>
           </p:cNvSpPr>
@@ -6539,14 +7083,14 @@
             <a:pPr eaLnBrk="1" hangingPunct="1"/>
             <a:r>
               <a:rPr lang="pt-BR" smtClean="0"/>
-              <a:t>Métodos</a:t>
-            </a:r>
-          </a:p>
-        </p:txBody>
-      </p:sp>
-      <p:sp>
-        <p:nvSpPr>
-          <p:cNvPr id="11267" name="Espaço Reservado para Conteúdo 2"/>
+              <a:t>Classe InputStream</a:t>
+            </a:r>
+          </a:p>
+        </p:txBody>
+      </p:sp>
+      <p:sp>
+        <p:nvSpPr>
+          <p:cNvPr id="10243" name="Espaço Reservado para Conteúdo 2"/>
           <p:cNvSpPr>
             <a:spLocks noGrp="1"/>
           </p:cNvSpPr>
@@ -6619,7 +7163,7 @@
       </p:grpSpPr>
       <p:sp>
         <p:nvSpPr>
-          <p:cNvPr id="12290" name="Título 1"/>
+          <p:cNvPr id="11266" name="Título 1"/>
           <p:cNvSpPr>
             <a:spLocks noGrp="1"/>
           </p:cNvSpPr>
@@ -6635,14 +7179,14 @@
             <a:pPr eaLnBrk="1" hangingPunct="1"/>
             <a:r>
               <a:rPr lang="pt-BR" smtClean="0"/>
-              <a:t>Leitura de arquivos binários</a:t>
-            </a:r>
-          </a:p>
-        </p:txBody>
-      </p:sp>
-      <p:sp>
-        <p:nvSpPr>
-          <p:cNvPr id="12291" name="Espaço Reservado para Conteúdo 2"/>
+              <a:t>Métodos</a:t>
+            </a:r>
+          </a:p>
+        </p:txBody>
+      </p:sp>
+      <p:sp>
+        <p:nvSpPr>
+          <p:cNvPr id="11267" name="Espaço Reservado para Conteúdo 2"/>
           <p:cNvSpPr>
             <a:spLocks noGrp="1"/>
           </p:cNvSpPr>
@@ -6715,7 +7259,7 @@
       </p:grpSpPr>
       <p:sp>
         <p:nvSpPr>
-          <p:cNvPr id="13314" name="Título 1"/>
+          <p:cNvPr id="12290" name="Título 1"/>
           <p:cNvSpPr>
             <a:spLocks noGrp="1"/>
           </p:cNvSpPr>
@@ -6731,14 +7275,14 @@
             <a:pPr eaLnBrk="1" hangingPunct="1"/>
             <a:r>
               <a:rPr lang="pt-BR" smtClean="0"/>
-              <a:t>Classe FileInputStream</a:t>
-            </a:r>
-          </a:p>
-        </p:txBody>
-      </p:sp>
-      <p:sp>
-        <p:nvSpPr>
-          <p:cNvPr id="13315" name="Espaço Reservado para Conteúdo 2"/>
+              <a:t>Leitura de arquivos binários</a:t>
+            </a:r>
+          </a:p>
+        </p:txBody>
+      </p:sp>
+      <p:sp>
+        <p:nvSpPr>
+          <p:cNvPr id="12291" name="Espaço Reservado para Conteúdo 2"/>
           <p:cNvSpPr>
             <a:spLocks noGrp="1"/>
           </p:cNvSpPr>
@@ -6811,7 +7355,7 @@
       </p:grpSpPr>
       <p:sp>
         <p:nvSpPr>
-          <p:cNvPr id="14338" name="Título 1"/>
+          <p:cNvPr id="13314" name="Título 1"/>
           <p:cNvSpPr>
             <a:spLocks noGrp="1"/>
           </p:cNvSpPr>
@@ -6827,14 +7371,14 @@
             <a:pPr eaLnBrk="1" hangingPunct="1"/>
             <a:r>
               <a:rPr lang="pt-BR" smtClean="0"/>
-              <a:t>Leitura de arquivos texto</a:t>
-            </a:r>
-          </a:p>
-        </p:txBody>
-      </p:sp>
-      <p:sp>
-        <p:nvSpPr>
-          <p:cNvPr id="14339" name="Espaço Reservado para Conteúdo 2"/>
+              <a:t>Classe FileInputStream</a:t>
+            </a:r>
+          </a:p>
+        </p:txBody>
+      </p:sp>
+      <p:sp>
+        <p:nvSpPr>
+          <p:cNvPr id="13315" name="Espaço Reservado para Conteúdo 2"/>
           <p:cNvSpPr>
             <a:spLocks noGrp="1"/>
           </p:cNvSpPr>
@@ -6907,7 +7451,7 @@
       </p:grpSpPr>
       <p:sp>
         <p:nvSpPr>
-          <p:cNvPr id="15362" name="Título 1"/>
+          <p:cNvPr id="14338" name="Título 1"/>
           <p:cNvSpPr>
             <a:spLocks noGrp="1"/>
           </p:cNvSpPr>
@@ -6923,14 +7467,14 @@
             <a:pPr eaLnBrk="1" hangingPunct="1"/>
             <a:r>
               <a:rPr lang="pt-BR" smtClean="0"/>
-              <a:t>Classe FileReader</a:t>
-            </a:r>
-          </a:p>
-        </p:txBody>
-      </p:sp>
-      <p:sp>
-        <p:nvSpPr>
-          <p:cNvPr id="15363" name="Espaço Reservado para Conteúdo 2"/>
+              <a:t>Leitura de arquivos texto</a:t>
+            </a:r>
+          </a:p>
+        </p:txBody>
+      </p:sp>
+      <p:sp>
+        <p:nvSpPr>
+          <p:cNvPr id="14339" name="Espaço Reservado para Conteúdo 2"/>
           <p:cNvSpPr>
             <a:spLocks noGrp="1"/>
           </p:cNvSpPr>

</xml_diff>